<commit_message>
agregar informacion a planeacion
</commit_message>
<xml_diff>
--- a/Planeacion.pptx
+++ b/Planeacion.pptx
@@ -7,11 +7,14 @@
   <p:sldIdLst>
     <p:sldId id="256" r:id="rId2"/>
     <p:sldId id="257" r:id="rId3"/>
-    <p:sldId id="258" r:id="rId4"/>
-    <p:sldId id="260" r:id="rId5"/>
-    <p:sldId id="259" r:id="rId6"/>
-    <p:sldId id="261" r:id="rId7"/>
-    <p:sldId id="262" r:id="rId8"/>
+    <p:sldId id="263" r:id="rId4"/>
+    <p:sldId id="264" r:id="rId5"/>
+    <p:sldId id="265" r:id="rId6"/>
+    <p:sldId id="258" r:id="rId7"/>
+    <p:sldId id="260" r:id="rId8"/>
+    <p:sldId id="259" r:id="rId9"/>
+    <p:sldId id="261" r:id="rId10"/>
+    <p:sldId id="262" r:id="rId11"/>
   </p:sldIdLst>
   <p:sldSz cx="9144000" cy="6858000" type="screen4x3"/>
   <p:notesSz cx="6858000" cy="9144000"/>
@@ -3908,6 +3911,81 @@
 </p:sld>
 </file>
 
+<file path=ppt/slides/slide10.xml><?xml version="1.0" encoding="utf-8"?>
+<p:sld xmlns:a="http://schemas.openxmlformats.org/drawingml/2006/main" xmlns:r="http://schemas.openxmlformats.org/officeDocument/2006/relationships" xmlns:p="http://schemas.openxmlformats.org/presentationml/2006/main">
+  <p:cSld>
+    <p:spTree>
+      <p:nvGrpSpPr>
+        <p:cNvPr id="1" name=""/>
+        <p:cNvGrpSpPr/>
+        <p:nvPr/>
+      </p:nvGrpSpPr>
+      <p:grpSpPr>
+        <a:xfrm>
+          <a:off x="0" y="0"/>
+          <a:ext cx="0" cy="0"/>
+          <a:chOff x="0" y="0"/>
+          <a:chExt cx="0" cy="0"/>
+        </a:xfrm>
+      </p:grpSpPr>
+      <p:sp>
+        <p:nvSpPr>
+          <p:cNvPr id="2" name="1 Título"/>
+          <p:cNvSpPr>
+            <a:spLocks noGrp="1"/>
+          </p:cNvSpPr>
+          <p:nvPr>
+            <p:ph type="title"/>
+          </p:nvPr>
+        </p:nvSpPr>
+        <p:spPr/>
+        <p:txBody>
+          <a:bodyPr/>
+          <a:lstStyle/>
+          <a:p>
+            <a:pPr algn="l"/>
+            <a:r>
+              <a:rPr lang="es-MX" dirty="0" smtClean="0"/>
+              <a:t>Ejemplo:</a:t>
+            </a:r>
+            <a:endParaRPr lang="es-MX" dirty="0"/>
+          </a:p>
+        </p:txBody>
+      </p:sp>
+      <p:pic>
+        <p:nvPicPr>
+          <p:cNvPr id="6" name="Picture 2" descr="C:\Users\V\Desktop\auditoria-programacion-organigrama-de-planeacion_23215_6_2.jpg"/>
+          <p:cNvPicPr>
+            <a:picLocks noChangeAspect="1" noChangeArrowheads="1"/>
+          </p:cNvPicPr>
+          <p:nvPr/>
+        </p:nvPicPr>
+        <p:blipFill>
+          <a:blip r:embed="rId2"/>
+          <a:srcRect/>
+          <a:stretch>
+            <a:fillRect/>
+          </a:stretch>
+        </p:blipFill>
+        <p:spPr bwMode="auto">
+          <a:xfrm>
+            <a:off x="1285852" y="1571612"/>
+            <a:ext cx="6429420" cy="4860953"/>
+          </a:xfrm>
+          <a:prstGeom prst="rect">
+            <a:avLst/>
+          </a:prstGeom>
+          <a:noFill/>
+        </p:spPr>
+      </p:pic>
+    </p:spTree>
+  </p:cSld>
+  <p:clrMapOvr>
+    <a:masterClrMapping/>
+  </p:clrMapOvr>
+</p:sld>
+</file>
+
 <file path=ppt/slides/slide2.xml><?xml version="1.0" encoding="utf-8"?>
 <p:sld xmlns:a="http://schemas.openxmlformats.org/drawingml/2006/main" xmlns:r="http://schemas.openxmlformats.org/officeDocument/2006/relationships" xmlns:p="http://schemas.openxmlformats.org/presentationml/2006/main">
   <p:cSld>
@@ -3937,10 +4015,16 @@
         </p:nvSpPr>
         <p:spPr/>
         <p:txBody>
-          <a:bodyPr/>
+          <a:bodyPr>
+            <a:normAutofit/>
+          </a:bodyPr>
           <a:lstStyle/>
           <a:p>
-            <a:endParaRPr lang="es-MX"/>
+            <a:r>
+              <a:rPr lang="es-MX" sz="2800" dirty="0" smtClean="0"/>
+              <a:t>PROCESO DE PLANEACION DEL NEGOCIO</a:t>
+            </a:r>
+            <a:endParaRPr lang="es-MX" sz="2800" dirty="0"/>
           </a:p>
         </p:txBody>
       </p:sp>
@@ -3956,10 +4040,35 @@
         </p:nvSpPr>
         <p:spPr/>
         <p:txBody>
-          <a:bodyPr/>
+          <a:bodyPr>
+            <a:normAutofit lnSpcReduction="10000"/>
+          </a:bodyPr>
           <a:lstStyle/>
           <a:p>
-            <a:endParaRPr lang="es-MX"/>
+            <a:pPr marL="0" indent="0">
+              <a:buNone/>
+            </a:pPr>
+            <a:r>
+              <a:rPr lang="es-MX" dirty="0"/>
+              <a:t>Sin un plan de negocios la empresa está a merced de las fuerzas del mercado y serán estas quienes determinen su futuro sin importar los deseos y anhelos del empresario.</a:t>
+            </a:r>
+          </a:p>
+          <a:p>
+            <a:pPr marL="0" indent="0">
+              <a:buNone/>
+            </a:pPr>
+            <a:r>
+              <a:rPr lang="es-MX" dirty="0"/>
+              <a:t> Planeación estratégica significa control, significa dirección, significa manejar las fuerzas del mercado para llevar la empresa hacia donde nosotros determinemos</a:t>
+            </a:r>
+            <a:r>
+              <a:rPr lang="es-MX" dirty="0" smtClean="0"/>
+              <a:t>.</a:t>
+            </a:r>
+            <a:endParaRPr lang="es-MX" dirty="0"/>
+          </a:p>
+          <a:p>
+            <a:endParaRPr lang="es-MX" dirty="0"/>
           </a:p>
         </p:txBody>
       </p:sp>
@@ -4007,123 +4116,156 @@
         </p:nvSpPr>
         <p:spPr/>
         <p:txBody>
+          <a:bodyPr>
+            <a:normAutofit fontScale="90000"/>
+          </a:bodyPr>
+          <a:lstStyle/>
+          <a:p>
+            <a:r>
+              <a:rPr lang="es-MX" sz="2800" dirty="0">
+                <a:effectLst/>
+              </a:rPr>
+              <a:t>Las características principales a tener en cuenta son: </a:t>
+            </a:r>
+            <a:br>
+              <a:rPr lang="es-MX" sz="2800" dirty="0">
+                <a:effectLst/>
+              </a:rPr>
+            </a:br>
+            <a:endParaRPr lang="es-MX" sz="2800" dirty="0"/>
+          </a:p>
+        </p:txBody>
+      </p:sp>
+      <p:sp>
+        <p:nvSpPr>
+          <p:cNvPr id="3" name="2 Marcador de contenido"/>
+          <p:cNvSpPr>
+            <a:spLocks noGrp="1"/>
+          </p:cNvSpPr>
+          <p:nvPr>
+            <p:ph idx="1"/>
+          </p:nvPr>
+        </p:nvSpPr>
+        <p:spPr/>
+        <p:txBody>
           <a:bodyPr/>
           <a:lstStyle/>
           <a:p>
-            <a:pPr marL="54864" lvl="1" algn="r" rtl="0">
-              <a:spcBef>
-                <a:spcPct val="0"/>
-              </a:spcBef>
+            <a:pPr>
+              <a:lnSpc>
+                <a:spcPct val="150000"/>
+              </a:lnSpc>
             </a:pPr>
             <a:r>
-              <a:rPr lang="es-ES_tradnl" sz="2800" dirty="0" smtClean="0">
-                <a:solidFill>
-                  <a:schemeClr val="tx1"/>
-                </a:solidFill>
-              </a:rPr>
-              <a:t>Proceso de planeación de la auditoria</a:t>
-            </a:r>
-            <a:r>
-              <a:rPr lang="es-MX" dirty="0" smtClean="0">
-                <a:solidFill>
-                  <a:schemeClr val="tx1"/>
-                </a:solidFill>
-              </a:rPr>
-              <a:t/>
-            </a:r>
-            <a:br>
-              <a:rPr lang="es-MX" dirty="0" smtClean="0">
-                <a:solidFill>
-                  <a:schemeClr val="tx1"/>
-                </a:solidFill>
-              </a:rPr>
-            </a:br>
+              <a:rPr lang="es-MX" sz="2400" dirty="0" smtClean="0"/>
+              <a:t>Las </a:t>
+            </a:r>
+            <a:r>
+              <a:rPr lang="es-MX" sz="2400" dirty="0"/>
+              <a:t>metas deben estar por escrito. </a:t>
+            </a:r>
+          </a:p>
+          <a:p>
+            <a:pPr>
+              <a:lnSpc>
+                <a:spcPct val="150000"/>
+              </a:lnSpc>
+            </a:pPr>
+            <a:r>
+              <a:rPr lang="es-MX" sz="2400" dirty="0" smtClean="0"/>
+              <a:t>Tener </a:t>
+            </a:r>
+            <a:r>
+              <a:rPr lang="es-MX" sz="2400" dirty="0"/>
+              <a:t>un tiempo definido para su logro.</a:t>
+            </a:r>
+          </a:p>
+          <a:p>
+            <a:pPr>
+              <a:lnSpc>
+                <a:spcPct val="150000"/>
+              </a:lnSpc>
+            </a:pPr>
+            <a:r>
+              <a:rPr lang="es-MX" sz="2400" dirty="0" smtClean="0"/>
+              <a:t>Contemplar </a:t>
+            </a:r>
+            <a:r>
+              <a:rPr lang="es-MX" sz="2400" dirty="0"/>
+              <a:t>fines y medios. </a:t>
+            </a:r>
+          </a:p>
+          <a:p>
+            <a:pPr>
+              <a:lnSpc>
+                <a:spcPct val="150000"/>
+              </a:lnSpc>
+            </a:pPr>
+            <a:r>
+              <a:rPr lang="es-MX" sz="2400" dirty="0" smtClean="0"/>
+              <a:t>Ser </a:t>
+            </a:r>
+            <a:r>
+              <a:rPr lang="es-MX" sz="2400" dirty="0"/>
+              <a:t>concretas, realistas y congruentes. </a:t>
+            </a:r>
+          </a:p>
+          <a:p>
+            <a:pPr>
+              <a:lnSpc>
+                <a:spcPct val="150000"/>
+              </a:lnSpc>
+            </a:pPr>
+            <a:r>
+              <a:rPr lang="es-MX" sz="2400" dirty="0" smtClean="0"/>
+              <a:t>Ser </a:t>
+            </a:r>
+            <a:r>
+              <a:rPr lang="es-MX" sz="2400" dirty="0"/>
+              <a:t>cuantitativas y medibles. </a:t>
+            </a:r>
+          </a:p>
+          <a:p>
+            <a:pPr>
+              <a:lnSpc>
+                <a:spcPct val="150000"/>
+              </a:lnSpc>
+            </a:pPr>
+            <a:r>
+              <a:rPr lang="es-MX" sz="2400" dirty="0" smtClean="0"/>
+              <a:t>Estar </a:t>
+            </a:r>
+            <a:r>
+              <a:rPr lang="es-MX" sz="2400" dirty="0"/>
+              <a:t>fijadas por los participantes. </a:t>
+            </a:r>
+          </a:p>
+          <a:p>
+            <a:pPr>
+              <a:lnSpc>
+                <a:spcPct val="150000"/>
+              </a:lnSpc>
+            </a:pPr>
+            <a:r>
+              <a:rPr lang="es-MX" sz="2400" dirty="0" smtClean="0"/>
+              <a:t>Las </a:t>
+            </a:r>
+            <a:r>
+              <a:rPr lang="es-MX" sz="2400" dirty="0"/>
+              <a:t>metas departamentales deben estar estrechamente relacionadas con las de toda la organización.</a:t>
+            </a:r>
+          </a:p>
+          <a:p>
             <a:endParaRPr lang="es-MX" dirty="0"/>
           </a:p>
         </p:txBody>
       </p:sp>
-      <p:sp>
-        <p:nvSpPr>
-          <p:cNvPr id="4" name="3 CuadroTexto"/>
-          <p:cNvSpPr txBox="1"/>
-          <p:nvPr/>
-        </p:nvSpPr>
-        <p:spPr>
-          <a:xfrm>
-            <a:off x="214282" y="1500174"/>
-            <a:ext cx="8501122" cy="4370427"/>
-          </a:xfrm>
-          <a:prstGeom prst="rect">
-            <a:avLst/>
-          </a:prstGeom>
-          <a:noFill/>
-        </p:spPr>
-        <p:txBody>
-          <a:bodyPr wrap="square" rtlCol="0">
-            <a:spAutoFit/>
-          </a:bodyPr>
-          <a:lstStyle/>
-          <a:p>
-            <a:pPr>
-              <a:buNone/>
-            </a:pPr>
-            <a:r>
-              <a:rPr lang="es-MX" sz="2000" dirty="0" smtClean="0"/>
-              <a:t>El Planeamiento de la Auditoria garantiza el diseño de una estrategia adaptada las condiciones de cada entidad tomando como base la información recopilada en la etapa de Exploración Previa</a:t>
-            </a:r>
-            <a:r>
-              <a:rPr lang="es-MX" sz="2000" dirty="0" smtClean="0"/>
-              <a:t>.</a:t>
-            </a:r>
-          </a:p>
-          <a:p>
-            <a:pPr>
-              <a:buNone/>
-            </a:pPr>
-            <a:endParaRPr lang="es-MX" sz="2000" dirty="0" smtClean="0"/>
-          </a:p>
-          <a:p>
-            <a:pPr>
-              <a:buNone/>
-            </a:pPr>
-            <a:r>
-              <a:rPr lang="es-MX" sz="2000" dirty="0" smtClean="0"/>
-              <a:t>En este proceso se organiza todo el trabajo de Auditoria, las personas implicadas, las tareas a realizar por cada uno de los ejecutantes, los recursos necesarios, los objetivos, programas a aplicar entre otros, es el momento de planear para garantizar éxito en la ejecución de la misma</a:t>
-            </a:r>
-            <a:r>
-              <a:rPr lang="es-MX" sz="2000" dirty="0" smtClean="0"/>
-              <a:t>.</a:t>
-            </a:r>
-          </a:p>
-          <a:p>
-            <a:pPr>
-              <a:buNone/>
-            </a:pPr>
-            <a:endParaRPr lang="es-MX" sz="2000" dirty="0" smtClean="0"/>
-          </a:p>
-          <a:p>
-            <a:pPr>
-              <a:buNone/>
-            </a:pPr>
-            <a:r>
-              <a:rPr lang="es-MX" sz="2000" dirty="0" smtClean="0"/>
-              <a:t>En el siguiente artículo se plantean los elementos más </a:t>
-            </a:r>
-            <a:r>
-              <a:rPr lang="es-MX" sz="2000" dirty="0" smtClean="0"/>
-              <a:t>importantes </a:t>
-            </a:r>
-            <a:r>
-              <a:rPr lang="es-MX" sz="2000" dirty="0" smtClean="0"/>
-              <a:t>de esta etapa con el fin de lograr el cumplimiento de los objetivos y la mejor ejecución de la Auditoria.</a:t>
-            </a:r>
-          </a:p>
-          <a:p>
-            <a:endParaRPr lang="es-MX" dirty="0"/>
-          </a:p>
-        </p:txBody>
-      </p:sp>
     </p:spTree>
+    <p:extLst>
+      <p:ext uri="{BB962C8B-B14F-4D97-AF65-F5344CB8AC3E}">
+        <p14:creationId xmlns:p14="http://schemas.microsoft.com/office/powerpoint/2010/main" val="2489286188"/>
+      </p:ext>
+    </p:extLst>
   </p:cSld>
   <p:clrMapOvr>
     <a:masterClrMapping/>
@@ -4160,77 +4302,74 @@
         </p:nvSpPr>
         <p:spPr/>
         <p:txBody>
+          <a:bodyPr>
+            <a:normAutofit/>
+          </a:bodyPr>
+          <a:lstStyle/>
+          <a:p>
+            <a:r>
+              <a:rPr lang="es-MX" sz="2800" dirty="0" smtClean="0"/>
+              <a:t>PROCESO DE PLANEACION EN INFORMATICA</a:t>
+            </a:r>
+            <a:endParaRPr lang="es-MX" sz="2800" dirty="0"/>
+          </a:p>
+        </p:txBody>
+      </p:sp>
+      <p:sp>
+        <p:nvSpPr>
+          <p:cNvPr id="3" name="2 Marcador de contenido"/>
+          <p:cNvSpPr>
+            <a:spLocks noGrp="1"/>
+          </p:cNvSpPr>
+          <p:nvPr>
+            <p:ph idx="1"/>
+          </p:nvPr>
+        </p:nvSpPr>
+        <p:spPr/>
+        <p:txBody>
           <a:bodyPr/>
           <a:lstStyle/>
           <a:p>
+            <a:pPr marL="0" indent="0">
+              <a:buNone/>
+            </a:pPr>
+            <a:endParaRPr lang="es-MX" dirty="0" smtClean="0"/>
+          </a:p>
+          <a:p>
+            <a:pPr marL="0" indent="0">
+              <a:buNone/>
+            </a:pPr>
             <a:r>
               <a:rPr lang="es-MX" dirty="0" smtClean="0"/>
-              <a:t>Elementos mas importantes:</a:t>
-            </a:r>
+              <a:t>La</a:t>
+            </a:r>
+            <a:r>
+              <a:rPr lang="es-MX" dirty="0"/>
+              <a:t> planeación estratégica de la </a:t>
+            </a:r>
+            <a:r>
+              <a:rPr lang="es-MX" dirty="0" smtClean="0"/>
+              <a:t>informática permite </a:t>
+            </a:r>
+            <a:r>
+              <a:rPr lang="es-MX" dirty="0"/>
+              <a:t>contar con un plan definido sobre el rumbo que tienen los negocios y el como, con qué y de que forma las tecnologías de información van a apoyar esas metas.</a:t>
+            </a:r>
+          </a:p>
+          <a:p>
+            <a:pPr marL="0" indent="0">
+              <a:buNone/>
+            </a:pPr>
             <a:endParaRPr lang="es-MX" dirty="0"/>
           </a:p>
         </p:txBody>
       </p:sp>
-      <p:sp>
-        <p:nvSpPr>
-          <p:cNvPr id="3" name="2 Marcador de contenido"/>
-          <p:cNvSpPr>
-            <a:spLocks noGrp="1"/>
-          </p:cNvSpPr>
-          <p:nvPr>
-            <p:ph idx="1"/>
-          </p:nvPr>
-        </p:nvSpPr>
-        <p:spPr/>
-        <p:txBody>
-          <a:bodyPr/>
-          <a:lstStyle/>
-          <a:p>
-            <a:r>
-              <a:rPr lang="es-MX" dirty="0" smtClean="0"/>
-              <a:t>Introducción</a:t>
-            </a:r>
-          </a:p>
-          <a:p>
-            <a:r>
-              <a:rPr lang="es-MX" dirty="0" smtClean="0"/>
-              <a:t>Objetivos</a:t>
-            </a:r>
-          </a:p>
-          <a:p>
-            <a:r>
-              <a:rPr lang="es-MX" dirty="0" smtClean="0"/>
-              <a:t>Planeamiento</a:t>
-            </a:r>
-          </a:p>
-          <a:p>
-            <a:r>
-              <a:rPr lang="es-MX" dirty="0" smtClean="0"/>
-              <a:t>Desarrollo</a:t>
-            </a:r>
-          </a:p>
-          <a:p>
-            <a:r>
-              <a:rPr lang="es-MX" dirty="0" smtClean="0"/>
-              <a:t>Estándares</a:t>
-            </a:r>
-          </a:p>
-          <a:p>
-            <a:r>
-              <a:rPr lang="es-MX" dirty="0" smtClean="0"/>
-              <a:t>Controles</a:t>
-            </a:r>
-          </a:p>
-          <a:p>
-            <a:r>
-              <a:rPr lang="es-MX" dirty="0" smtClean="0"/>
-              <a:t>Riesgos</a:t>
-            </a:r>
-            <a:endParaRPr lang="es-MX" dirty="0"/>
-          </a:p>
-        </p:txBody>
-      </p:sp>
     </p:spTree>
+    <p:extLst>
+      <p:ext uri="{BB962C8B-B14F-4D97-AF65-F5344CB8AC3E}">
+        <p14:creationId xmlns:p14="http://schemas.microsoft.com/office/powerpoint/2010/main" val="3890069581"/>
+      </p:ext>
+    </p:extLst>
   </p:cSld>
   <p:clrMapOvr>
     <a:masterClrMapping/>
@@ -4265,129 +4404,85 @@
             <p:ph type="title"/>
           </p:nvPr>
         </p:nvSpPr>
-        <p:spPr>
-          <a:xfrm>
-            <a:off x="-285784" y="0"/>
-            <a:ext cx="9644098" cy="1143000"/>
-          </a:xfrm>
-        </p:spPr>
+        <p:spPr/>
+        <p:txBody>
+          <a:bodyPr/>
+          <a:lstStyle/>
+          <a:p>
+            <a:r>
+              <a:rPr lang="es-MX" dirty="0" smtClean="0"/>
+              <a:t>BENEFICIOS</a:t>
+            </a:r>
+            <a:endParaRPr lang="es-MX" dirty="0"/>
+          </a:p>
+        </p:txBody>
+      </p:sp>
+      <p:sp>
+        <p:nvSpPr>
+          <p:cNvPr id="3" name="2 Marcador de contenido"/>
+          <p:cNvSpPr>
+            <a:spLocks noGrp="1"/>
+          </p:cNvSpPr>
+          <p:nvPr>
+            <p:ph idx="1"/>
+          </p:nvPr>
+        </p:nvSpPr>
+        <p:spPr/>
         <p:txBody>
           <a:bodyPr>
-            <a:noAutofit/>
+            <a:normAutofit fontScale="92500" lnSpcReduction="20000"/>
           </a:bodyPr>
           <a:lstStyle/>
           <a:p>
-            <a:pPr algn="ctr"/>
-            <a:r>
-              <a:rPr lang="es-ES_tradnl" sz="2800" dirty="0" smtClean="0">
-                <a:solidFill>
-                  <a:schemeClr val="tx1"/>
-                </a:solidFill>
-              </a:rPr>
-              <a:t>Proceso de planeación de la auditoria informática</a:t>
-            </a:r>
-            <a:endParaRPr lang="es-MX" sz="2800" dirty="0"/>
-          </a:p>
-        </p:txBody>
-      </p:sp>
-      <p:sp>
-        <p:nvSpPr>
-          <p:cNvPr id="4" name="3 CuadroTexto"/>
-          <p:cNvSpPr txBox="1"/>
-          <p:nvPr/>
-        </p:nvSpPr>
-        <p:spPr>
-          <a:xfrm>
-            <a:off x="214282" y="1500174"/>
-            <a:ext cx="8643998" cy="3108543"/>
-          </a:xfrm>
-          <a:prstGeom prst="rect">
-            <a:avLst/>
-          </a:prstGeom>
-          <a:noFill/>
-        </p:spPr>
-        <p:txBody>
-          <a:bodyPr wrap="square" rtlCol="0">
-            <a:spAutoFit/>
-          </a:bodyPr>
-          <a:lstStyle/>
-          <a:p>
-            <a:pPr algn="just"/>
             <a:r>
               <a:rPr lang="es-MX" dirty="0" smtClean="0"/>
-              <a:t/>
-            </a:r>
-            <a:br>
+              <a:t>Planear en lugar </a:t>
+            </a:r>
+            <a:r>
+              <a:rPr lang="es-MX" smtClean="0"/>
+              <a:t>de improvisar.</a:t>
+            </a:r>
+            <a:endParaRPr lang="es-MX" dirty="0" smtClean="0"/>
+          </a:p>
+          <a:p>
+            <a:r>
               <a:rPr lang="es-MX" dirty="0" smtClean="0"/>
-            </a:br>
-            <a:r>
-              <a:rPr lang="es-MX" sz="2000" dirty="0" smtClean="0"/>
-              <a:t>Para hacer una adecuada planeación de la auditoría en informática, hay que seguir una serie </a:t>
-            </a:r>
-            <a:r>
-              <a:rPr lang="es-MX" sz="2000" dirty="0" smtClean="0"/>
-              <a:t>de pasos </a:t>
-            </a:r>
-            <a:r>
-              <a:rPr lang="es-MX" sz="2000" dirty="0" smtClean="0"/>
-              <a:t>previos que permitirán dimensionar el tamaño y características del área dentro </a:t>
-            </a:r>
-            <a:r>
-              <a:rPr lang="es-MX" sz="2000" dirty="0" smtClean="0"/>
-              <a:t>del organismo </a:t>
-            </a:r>
-            <a:r>
-              <a:rPr lang="es-MX" sz="2000" dirty="0" smtClean="0"/>
-              <a:t>a auditar, sus sistemas, </a:t>
-            </a:r>
-            <a:r>
-              <a:rPr lang="es-MX" sz="2000" dirty="0" smtClean="0"/>
-              <a:t> organización </a:t>
-            </a:r>
-            <a:r>
-              <a:rPr lang="es-MX" sz="2000" dirty="0" smtClean="0"/>
-              <a:t>y equipo; con ello podremos determinar </a:t>
-            </a:r>
-            <a:r>
-              <a:rPr lang="es-MX" sz="2000" dirty="0" smtClean="0"/>
-              <a:t>el número </a:t>
-            </a:r>
-            <a:r>
-              <a:rPr lang="es-MX" sz="2000" dirty="0" smtClean="0"/>
-              <a:t>y </a:t>
-            </a:r>
-            <a:r>
-              <a:rPr lang="es-MX" sz="2000" dirty="0" smtClean="0"/>
-              <a:t>características </a:t>
-            </a:r>
-            <a:r>
-              <a:rPr lang="es-MX" sz="2000" dirty="0" smtClean="0"/>
-              <a:t>del personal de auditoría, las herramientas necesarias, el tiempo </a:t>
-            </a:r>
-            <a:r>
-              <a:rPr lang="es-MX" sz="2000" dirty="0" smtClean="0"/>
-              <a:t>y costo</a:t>
-            </a:r>
-            <a:r>
-              <a:rPr lang="es-MX" sz="2000" dirty="0" smtClean="0"/>
-              <a:t>, así como definir los alcances de la auditoría para, en caso necesario, poder elaborar </a:t>
-            </a:r>
-            <a:r>
-              <a:rPr lang="es-MX" sz="2000" dirty="0" smtClean="0"/>
-              <a:t>el contrato </a:t>
-            </a:r>
-            <a:r>
-              <a:rPr lang="es-MX" sz="2000" dirty="0" smtClean="0"/>
-              <a:t>de servicios.</a:t>
-            </a:r>
-            <a:endParaRPr lang="es-MX" dirty="0" smtClean="0"/>
-          </a:p>
-          <a:p>
+              <a:t>Determinar en donde está en este momento, hacia donde quiere ir y como va a llegar a ese punto.</a:t>
+            </a:r>
+          </a:p>
+          <a:p>
+            <a:r>
+              <a:rPr lang="es-MX" dirty="0" smtClean="0"/>
+              <a:t>Determinar el esfuerzo requerido en sistemas para lograr sus metas, así como los beneficios asociados.</a:t>
+            </a:r>
+          </a:p>
+          <a:p>
+            <a:r>
+              <a:rPr lang="es-MX" dirty="0" smtClean="0"/>
+              <a:t>Ahorrar tiempo y dinero.</a:t>
+            </a:r>
+          </a:p>
+          <a:p>
+            <a:r>
+              <a:rPr lang="es-MX" dirty="0" smtClean="0"/>
+              <a:t>Tomar mejores decisiones en cuanto a la informática.</a:t>
+            </a:r>
+          </a:p>
+          <a:p>
+            <a:r>
+              <a:rPr lang="es-MX" dirty="0" smtClean="0"/>
+              <a:t>Tener una herramienta que mida sus avances en automatización.</a:t>
+            </a:r>
             <a:endParaRPr lang="es-MX" dirty="0"/>
           </a:p>
         </p:txBody>
       </p:sp>
     </p:spTree>
+    <p:extLst>
+      <p:ext uri="{BB962C8B-B14F-4D97-AF65-F5344CB8AC3E}">
+        <p14:creationId xmlns:p14="http://schemas.microsoft.com/office/powerpoint/2010/main" val="4039499985"/>
+      </p:ext>
+    </p:extLst>
   </p:cSld>
   <p:clrMapOvr>
     <a:masterClrMapping/>
@@ -4424,60 +4519,99 @@
         </p:nvSpPr>
         <p:spPr/>
         <p:txBody>
-          <a:bodyPr>
-            <a:noAutofit/>
+          <a:bodyPr/>
+          <a:lstStyle/>
+          <a:p>
+            <a:pPr marL="54864" lvl="1" algn="r" rtl="0">
+              <a:spcBef>
+                <a:spcPct val="0"/>
+              </a:spcBef>
+            </a:pPr>
+            <a:r>
+              <a:rPr lang="es-ES_tradnl" sz="2800" dirty="0" smtClean="0">
+                <a:solidFill>
+                  <a:schemeClr val="tx1"/>
+                </a:solidFill>
+              </a:rPr>
+              <a:t>Proceso de planeación de la auditoria</a:t>
+            </a:r>
+            <a:r>
+              <a:rPr lang="es-MX" dirty="0" smtClean="0">
+                <a:solidFill>
+                  <a:schemeClr val="tx1"/>
+                </a:solidFill>
+              </a:rPr>
+              <a:t/>
+            </a:r>
+            <a:br>
+              <a:rPr lang="es-MX" dirty="0" smtClean="0">
+                <a:solidFill>
+                  <a:schemeClr val="tx1"/>
+                </a:solidFill>
+              </a:rPr>
+            </a:br>
+            <a:endParaRPr lang="es-MX" dirty="0"/>
+          </a:p>
+        </p:txBody>
+      </p:sp>
+      <p:sp>
+        <p:nvSpPr>
+          <p:cNvPr id="4" name="3 CuadroTexto"/>
+          <p:cNvSpPr txBox="1"/>
+          <p:nvPr/>
+        </p:nvSpPr>
+        <p:spPr>
+          <a:xfrm>
+            <a:off x="214282" y="1500174"/>
+            <a:ext cx="8501122" cy="4370427"/>
+          </a:xfrm>
+          <a:prstGeom prst="rect">
+            <a:avLst/>
+          </a:prstGeom>
+          <a:noFill/>
+        </p:spPr>
+        <p:txBody>
+          <a:bodyPr wrap="square" rtlCol="0">
+            <a:spAutoFit/>
           </a:bodyPr>
-          <a:lstStyle/>
-          <a:p>
-            <a:pPr algn="ctr"/>
-            <a:r>
-              <a:rPr lang="es-MX" sz="3200" dirty="0" smtClean="0"/>
-              <a:t>En el caso de la auditoria en informática, la planeación es </a:t>
-            </a:r>
-            <a:r>
-              <a:rPr lang="es-MX" sz="3200" dirty="0" smtClean="0"/>
-              <a:t>fundamental:</a:t>
-            </a:r>
-            <a:endParaRPr lang="es-MX" sz="3200" dirty="0"/>
-          </a:p>
-        </p:txBody>
-      </p:sp>
-      <p:sp>
-        <p:nvSpPr>
-          <p:cNvPr id="3" name="2 Marcador de contenido"/>
-          <p:cNvSpPr>
-            <a:spLocks noGrp="1"/>
-          </p:cNvSpPr>
-          <p:nvPr>
-            <p:ph idx="1"/>
-          </p:nvPr>
-        </p:nvSpPr>
-        <p:spPr/>
-        <p:txBody>
-          <a:bodyPr/>
           <a:lstStyle/>
           <a:p>
             <a:pPr>
               <a:buNone/>
             </a:pPr>
-            <a:endParaRPr lang="es-MX" dirty="0" smtClean="0"/>
-          </a:p>
-          <a:p>
-            <a:r>
-              <a:rPr lang="es-MX" sz="2800" dirty="0" smtClean="0"/>
-              <a:t>Evaluación administrativa del área de procesos electrónicos.</a:t>
-            </a:r>
-          </a:p>
-          <a:p>
-            <a:r>
-              <a:rPr lang="es-MX" sz="2800" dirty="0" smtClean="0"/>
-              <a:t>Evaluación de los sistemas y procedimientos.</a:t>
-            </a:r>
-          </a:p>
-          <a:p>
-            <a:r>
-              <a:rPr lang="es-MX" sz="2800" dirty="0" smtClean="0"/>
-              <a:t>Evaluación de los equipos de cómputo.</a:t>
+            <a:r>
+              <a:rPr lang="es-MX" sz="2000" dirty="0" smtClean="0"/>
+              <a:t>El Planeamiento de la Auditoria garantiza el diseño de una estrategia adaptada las condiciones de cada entidad tomando como base la información recopilada en la etapa de Exploración Previa.</a:t>
+            </a:r>
+          </a:p>
+          <a:p>
+            <a:pPr>
+              <a:buNone/>
+            </a:pPr>
+            <a:endParaRPr lang="es-MX" sz="2000" dirty="0" smtClean="0"/>
+          </a:p>
+          <a:p>
+            <a:pPr>
+              <a:buNone/>
+            </a:pPr>
+            <a:r>
+              <a:rPr lang="es-MX" sz="2000" dirty="0" smtClean="0"/>
+              <a:t>En este proceso se organiza todo el trabajo de Auditoria, las personas implicadas, las tareas a realizar por cada uno de los ejecutantes, los recursos necesarios, los objetivos, programas a aplicar entre otros, es el momento de planear para garantizar éxito en la ejecución de la misma.</a:t>
+            </a:r>
+          </a:p>
+          <a:p>
+            <a:pPr>
+              <a:buNone/>
+            </a:pPr>
+            <a:endParaRPr lang="es-MX" sz="2000" dirty="0" smtClean="0"/>
+          </a:p>
+          <a:p>
+            <a:pPr>
+              <a:buNone/>
+            </a:pPr>
+            <a:r>
+              <a:rPr lang="es-MX" sz="2000" dirty="0" smtClean="0"/>
+              <a:t>En el siguiente artículo se plantean los elementos más importantes de esta etapa con el fin de lograr el cumplimiento de los objetivos y la mejor ejecución de la Auditoria.</a:t>
             </a:r>
           </a:p>
           <a:p>
@@ -4525,41 +4659,268 @@
           <a:bodyPr/>
           <a:lstStyle/>
           <a:p>
-            <a:pPr algn="l"/>
             <a:r>
               <a:rPr lang="es-MX" dirty="0" smtClean="0"/>
-              <a:t>Ejemplo:</a:t>
+              <a:t>Elementos mas importantes:</a:t>
             </a:r>
             <a:endParaRPr lang="es-MX" dirty="0"/>
           </a:p>
         </p:txBody>
       </p:sp>
-      <p:pic>
-        <p:nvPicPr>
-          <p:cNvPr id="6" name="Picture 2" descr="C:\Users\V\Desktop\auditoria-programacion-organigrama-de-planeacion_23215_6_2.jpg"/>
-          <p:cNvPicPr>
-            <a:picLocks noChangeAspect="1" noChangeArrowheads="1"/>
-          </p:cNvPicPr>
+      <p:sp>
+        <p:nvSpPr>
+          <p:cNvPr id="3" name="2 Marcador de contenido"/>
+          <p:cNvSpPr>
+            <a:spLocks noGrp="1"/>
+          </p:cNvSpPr>
+          <p:nvPr>
+            <p:ph idx="1"/>
+          </p:nvPr>
+        </p:nvSpPr>
+        <p:spPr/>
+        <p:txBody>
+          <a:bodyPr/>
+          <a:lstStyle/>
+          <a:p>
+            <a:r>
+              <a:rPr lang="es-MX" dirty="0" smtClean="0"/>
+              <a:t>Introducción</a:t>
+            </a:r>
+          </a:p>
+          <a:p>
+            <a:r>
+              <a:rPr lang="es-MX" dirty="0" smtClean="0"/>
+              <a:t>Objetivos</a:t>
+            </a:r>
+          </a:p>
+          <a:p>
+            <a:r>
+              <a:rPr lang="es-MX" dirty="0" smtClean="0"/>
+              <a:t>Planeamiento</a:t>
+            </a:r>
+          </a:p>
+          <a:p>
+            <a:r>
+              <a:rPr lang="es-MX" dirty="0" smtClean="0"/>
+              <a:t>Desarrollo</a:t>
+            </a:r>
+          </a:p>
+          <a:p>
+            <a:r>
+              <a:rPr lang="es-MX" dirty="0" smtClean="0"/>
+              <a:t>Estándares</a:t>
+            </a:r>
+          </a:p>
+          <a:p>
+            <a:r>
+              <a:rPr lang="es-MX" dirty="0" smtClean="0"/>
+              <a:t>Controles</a:t>
+            </a:r>
+          </a:p>
+          <a:p>
+            <a:r>
+              <a:rPr lang="es-MX" dirty="0" smtClean="0"/>
+              <a:t>Riesgos</a:t>
+            </a:r>
+            <a:endParaRPr lang="es-MX" dirty="0"/>
+          </a:p>
+        </p:txBody>
+      </p:sp>
+    </p:spTree>
+  </p:cSld>
+  <p:clrMapOvr>
+    <a:masterClrMapping/>
+  </p:clrMapOvr>
+</p:sld>
+</file>
+
+<file path=ppt/slides/slide8.xml><?xml version="1.0" encoding="utf-8"?>
+<p:sld xmlns:a="http://schemas.openxmlformats.org/drawingml/2006/main" xmlns:r="http://schemas.openxmlformats.org/officeDocument/2006/relationships" xmlns:p="http://schemas.openxmlformats.org/presentationml/2006/main">
+  <p:cSld>
+    <p:spTree>
+      <p:nvGrpSpPr>
+        <p:cNvPr id="1" name=""/>
+        <p:cNvGrpSpPr/>
+        <p:nvPr/>
+      </p:nvGrpSpPr>
+      <p:grpSpPr>
+        <a:xfrm>
+          <a:off x="0" y="0"/>
+          <a:ext cx="0" cy="0"/>
+          <a:chOff x="0" y="0"/>
+          <a:chExt cx="0" cy="0"/>
+        </a:xfrm>
+      </p:grpSpPr>
+      <p:sp>
+        <p:nvSpPr>
+          <p:cNvPr id="2" name="1 Título"/>
+          <p:cNvSpPr>
+            <a:spLocks noGrp="1"/>
+          </p:cNvSpPr>
+          <p:nvPr>
+            <p:ph type="title"/>
+          </p:nvPr>
+        </p:nvSpPr>
+        <p:spPr>
+          <a:xfrm>
+            <a:off x="-285784" y="0"/>
+            <a:ext cx="9644098" cy="1143000"/>
+          </a:xfrm>
+        </p:spPr>
+        <p:txBody>
+          <a:bodyPr>
+            <a:noAutofit/>
+          </a:bodyPr>
+          <a:lstStyle/>
+          <a:p>
+            <a:pPr algn="ctr"/>
+            <a:r>
+              <a:rPr lang="es-ES_tradnl" sz="2800" dirty="0" smtClean="0">
+                <a:solidFill>
+                  <a:schemeClr val="tx1"/>
+                </a:solidFill>
+              </a:rPr>
+              <a:t>Proceso de planeación de la auditoria informática</a:t>
+            </a:r>
+            <a:endParaRPr lang="es-MX" sz="2800" dirty="0"/>
+          </a:p>
+        </p:txBody>
+      </p:sp>
+      <p:sp>
+        <p:nvSpPr>
+          <p:cNvPr id="4" name="3 CuadroTexto"/>
+          <p:cNvSpPr txBox="1"/>
           <p:nvPr/>
-        </p:nvPicPr>
-        <p:blipFill>
-          <a:blip r:embed="rId2"/>
-          <a:srcRect/>
-          <a:stretch>
-            <a:fillRect/>
-          </a:stretch>
-        </p:blipFill>
-        <p:spPr bwMode="auto">
-          <a:xfrm>
-            <a:off x="1285852" y="1571612"/>
-            <a:ext cx="6429420" cy="4860953"/>
+        </p:nvSpPr>
+        <p:spPr>
+          <a:xfrm>
+            <a:off x="214282" y="1500174"/>
+            <a:ext cx="8643998" cy="3108543"/>
           </a:xfrm>
           <a:prstGeom prst="rect">
             <a:avLst/>
           </a:prstGeom>
           <a:noFill/>
         </p:spPr>
-      </p:pic>
+        <p:txBody>
+          <a:bodyPr wrap="square" rtlCol="0">
+            <a:spAutoFit/>
+          </a:bodyPr>
+          <a:lstStyle/>
+          <a:p>
+            <a:pPr algn="just"/>
+            <a:r>
+              <a:rPr lang="es-MX" dirty="0" smtClean="0"/>
+              <a:t/>
+            </a:r>
+            <a:br>
+              <a:rPr lang="es-MX" dirty="0" smtClean="0"/>
+            </a:br>
+            <a:r>
+              <a:rPr lang="es-MX" sz="2000" dirty="0" smtClean="0"/>
+              <a:t>Para hacer una adecuada planeación de la auditoría en informática, hay que seguir una serie de pasos previos que permitirán dimensionar el tamaño y características del área dentro del organismo a auditar, sus sistemas,  organización y equipo; con ello podremos determinar el número y características del personal de auditoría, las herramientas necesarias, el tiempo y costo, así como definir los alcances de la auditoría para, en caso necesario, poder elaborar el contrato de servicios.</a:t>
+            </a:r>
+            <a:endParaRPr lang="es-MX" dirty="0" smtClean="0"/>
+          </a:p>
+          <a:p>
+            <a:endParaRPr lang="es-MX" dirty="0"/>
+          </a:p>
+        </p:txBody>
+      </p:sp>
+    </p:spTree>
+  </p:cSld>
+  <p:clrMapOvr>
+    <a:masterClrMapping/>
+  </p:clrMapOvr>
+</p:sld>
+</file>
+
+<file path=ppt/slides/slide9.xml><?xml version="1.0" encoding="utf-8"?>
+<p:sld xmlns:a="http://schemas.openxmlformats.org/drawingml/2006/main" xmlns:r="http://schemas.openxmlformats.org/officeDocument/2006/relationships" xmlns:p="http://schemas.openxmlformats.org/presentationml/2006/main">
+  <p:cSld>
+    <p:spTree>
+      <p:nvGrpSpPr>
+        <p:cNvPr id="1" name=""/>
+        <p:cNvGrpSpPr/>
+        <p:nvPr/>
+      </p:nvGrpSpPr>
+      <p:grpSpPr>
+        <a:xfrm>
+          <a:off x="0" y="0"/>
+          <a:ext cx="0" cy="0"/>
+          <a:chOff x="0" y="0"/>
+          <a:chExt cx="0" cy="0"/>
+        </a:xfrm>
+      </p:grpSpPr>
+      <p:sp>
+        <p:nvSpPr>
+          <p:cNvPr id="2" name="1 Título"/>
+          <p:cNvSpPr>
+            <a:spLocks noGrp="1"/>
+          </p:cNvSpPr>
+          <p:nvPr>
+            <p:ph type="title"/>
+          </p:nvPr>
+        </p:nvSpPr>
+        <p:spPr/>
+        <p:txBody>
+          <a:bodyPr>
+            <a:noAutofit/>
+          </a:bodyPr>
+          <a:lstStyle/>
+          <a:p>
+            <a:pPr algn="ctr"/>
+            <a:r>
+              <a:rPr lang="es-MX" sz="3200" dirty="0" smtClean="0"/>
+              <a:t>En el caso de la auditoria en informática, la planeación es fundamental:</a:t>
+            </a:r>
+            <a:endParaRPr lang="es-MX" sz="3200" dirty="0"/>
+          </a:p>
+        </p:txBody>
+      </p:sp>
+      <p:sp>
+        <p:nvSpPr>
+          <p:cNvPr id="3" name="2 Marcador de contenido"/>
+          <p:cNvSpPr>
+            <a:spLocks noGrp="1"/>
+          </p:cNvSpPr>
+          <p:nvPr>
+            <p:ph idx="1"/>
+          </p:nvPr>
+        </p:nvSpPr>
+        <p:spPr/>
+        <p:txBody>
+          <a:bodyPr/>
+          <a:lstStyle/>
+          <a:p>
+            <a:pPr>
+              <a:buNone/>
+            </a:pPr>
+            <a:endParaRPr lang="es-MX" dirty="0" smtClean="0"/>
+          </a:p>
+          <a:p>
+            <a:r>
+              <a:rPr lang="es-MX" sz="2800" dirty="0" smtClean="0"/>
+              <a:t>Evaluación administrativa del área de procesos electrónicos.</a:t>
+            </a:r>
+          </a:p>
+          <a:p>
+            <a:r>
+              <a:rPr lang="es-MX" sz="2800" dirty="0" smtClean="0"/>
+              <a:t>Evaluación de los sistemas y procedimientos.</a:t>
+            </a:r>
+          </a:p>
+          <a:p>
+            <a:r>
+              <a:rPr lang="es-MX" sz="2800" dirty="0" smtClean="0"/>
+              <a:t>Evaluación de los equipos de cómputo.</a:t>
+            </a:r>
+          </a:p>
+          <a:p>
+            <a:endParaRPr lang="es-MX" dirty="0"/>
+          </a:p>
+        </p:txBody>
+      </p:sp>
     </p:spTree>
   </p:cSld>
   <p:clrMapOvr>

</xml_diff>

<commit_message>
Comentarios en archivo Planeacion
</commit_message>
<xml_diff>
--- a/Planeacion.pptx
+++ b/Planeacion.pptx
@@ -114,6 +114,22 @@
       </a:defRPr>
     </a:lvl9pPr>
   </p:defaultTextStyle>
+  <p:extLst>
+    <p:ext uri="{EFAFB233-063F-42B5-8137-9DF3F51BA10A}">
+      <p15:sldGuideLst xmlns:p15="http://schemas.microsoft.com/office/powerpoint/2012/main">
+        <p15:guide id="1" orient="horz" pos="2160">
+          <p15:clr>
+            <a:srgbClr val="A4A3A4"/>
+          </p15:clr>
+        </p15:guide>
+        <p15:guide id="2" pos="2880">
+          <p15:clr>
+            <a:srgbClr val="A4A3A4"/>
+          </p15:clr>
+        </p15:guide>
+      </p15:sldGuideLst>
+    </p:ext>
+  </p:extLst>
 </p:presentation>
 </file>
 
@@ -3984,6 +4000,13 @@
   <p:clrMapOvr>
     <a:masterClrMapping/>
   </p:clrMapOvr>
+  <p:timing>
+    <p:tnLst>
+      <p:par>
+        <p:cTn id="1" dur="indefinite" restart="never" nodeType="tmRoot"/>
+      </p:par>
+    </p:tnLst>
+  </p:timing>
 </p:sld>
 </file>
 
@@ -4195,19 +4218,48 @@
                   <a:srgbClr val="FF0000"/>
                 </a:solidFill>
               </a:rPr>
-              <a:t>David</a:t>
-            </a:r>
-            <a:r>
-              <a:rPr lang="es-MX" dirty="0" smtClean="0">
+              <a:t>David:  </a:t>
+            </a:r>
+            <a:r>
+              <a:rPr lang="es-MX" dirty="0" smtClean="0"/>
+              <a:t>buen contenido, interesante tema.</a:t>
+            </a:r>
+            <a:endParaRPr lang="es-MX" dirty="0"/>
+          </a:p>
+        </p:txBody>
+      </p:sp>
+      <p:sp>
+        <p:nvSpPr>
+          <p:cNvPr id="7" name="5 Rectángulo"/>
+          <p:cNvSpPr/>
+          <p:nvPr/>
+        </p:nvSpPr>
+        <p:spPr>
+          <a:xfrm>
+            <a:off x="719572" y="4722458"/>
+            <a:ext cx="7704856" cy="369332"/>
+          </a:xfrm>
+          <a:prstGeom prst="rect">
+            <a:avLst/>
+          </a:prstGeom>
+        </p:spPr>
+        <p:txBody>
+          <a:bodyPr wrap="square">
+            <a:spAutoFit/>
+          </a:bodyPr>
+          <a:lstStyle/>
+          <a:p>
+            <a:r>
+              <a:rPr lang="es-MX" smtClean="0">
                 <a:solidFill>
                   <a:srgbClr val="FF0000"/>
                 </a:solidFill>
               </a:rPr>
-              <a:t>:  </a:t>
+              <a:t>Javier Lizárraga:  </a:t>
             </a:r>
             <a:r>
               <a:rPr lang="es-MX" dirty="0" smtClean="0"/>
-              <a:t>buen contenido, interesante tema.</a:t>
+              <a:t>Muy buena presentación.</a:t>
             </a:r>
             <a:endParaRPr lang="es-MX" dirty="0"/>
           </a:p>
@@ -4223,6 +4275,13 @@
   <p:clrMapOvr>
     <a:masterClrMapping/>
   </p:clrMapOvr>
+  <p:timing>
+    <p:tnLst>
+      <p:par>
+        <p:cTn id="1" dur="indefinite" restart="never" nodeType="tmRoot"/>
+      </p:par>
+    </p:tnLst>
+  </p:timing>
 </p:sld>
 </file>
 
@@ -4510,6 +4569,13 @@
   <p:clrMapOvr>
     <a:masterClrMapping/>
   </p:clrMapOvr>
+  <p:timing>
+    <p:tnLst>
+      <p:par>
+        <p:cTn id="1" dur="indefinite" restart="never" nodeType="tmRoot"/>
+      </p:par>
+    </p:tnLst>
+  </p:timing>
 </p:sld>
 </file>
 
@@ -4614,6 +4680,13 @@
   <p:clrMapOvr>
     <a:masterClrMapping/>
   </p:clrMapOvr>
+  <p:timing>
+    <p:tnLst>
+      <p:par>
+        <p:cTn id="1" dur="indefinite" restart="never" nodeType="tmRoot"/>
+      </p:par>
+    </p:tnLst>
+  </p:timing>
 </p:sld>
 </file>
 
@@ -4727,6 +4800,13 @@
   <p:clrMapOvr>
     <a:masterClrMapping/>
   </p:clrMapOvr>
+  <p:timing>
+    <p:tnLst>
+      <p:par>
+        <p:cTn id="1" dur="indefinite" restart="never" nodeType="tmRoot"/>
+      </p:par>
+    </p:tnLst>
+  </p:timing>
 </p:sld>
 </file>
 
@@ -4864,6 +4944,13 @@
   <p:clrMapOvr>
     <a:masterClrMapping/>
   </p:clrMapOvr>
+  <p:timing>
+    <p:tnLst>
+      <p:par>
+        <p:cTn id="1" dur="indefinite" restart="never" nodeType="tmRoot"/>
+      </p:par>
+    </p:tnLst>
+  </p:timing>
 </p:sld>
 </file>
 
@@ -4971,6 +5058,13 @@
   <p:clrMapOvr>
     <a:masterClrMapping/>
   </p:clrMapOvr>
+  <p:timing>
+    <p:tnLst>
+      <p:par>
+        <p:cTn id="1" dur="indefinite" restart="never" nodeType="tmRoot"/>
+      </p:par>
+    </p:tnLst>
+  </p:timing>
 </p:sld>
 </file>
 
@@ -5072,6 +5166,13 @@
   <p:clrMapOvr>
     <a:masterClrMapping/>
   </p:clrMapOvr>
+  <p:timing>
+    <p:tnLst>
+      <p:par>
+        <p:cTn id="1" dur="indefinite" restart="never" nodeType="tmRoot"/>
+      </p:par>
+    </p:tnLst>
+  </p:timing>
 </p:sld>
 </file>
 
@@ -5166,6 +5267,13 @@
   <p:clrMapOvr>
     <a:masterClrMapping/>
   </p:clrMapOvr>
+  <p:timing>
+    <p:tnLst>
+      <p:par>
+        <p:cTn id="1" dur="indefinite" restart="never" nodeType="tmRoot"/>
+      </p:par>
+    </p:tnLst>
+  </p:timing>
 </p:sld>
 </file>
 

</xml_diff>